<commit_message>
Minor changes to File Systems slides
</commit_message>
<xml_diff>
--- a/lectures/18 - File Systems.pptx
+++ b/lectures/18 - File Systems.pptx
@@ -291,7 +291,7 @@
             <a:fld id="{DF614CD2-14A4-4371-9F2C-5A613AFFE864}" type="datetimeFigureOut">
               <a:rPr lang="en-US" smtClean="0"/>
               <a:pPr/>
-              <a:t>17-Apr-18</a:t>
+              <a:t>19-Apr-18</a:t>
             </a:fld>
             <a:endParaRPr lang="en-US"/>
           </a:p>
@@ -8034,7 +8034,7 @@
           <a:p>
             <a:fld id="{4572D393-A7BE-4A00-B825-63351810B4E8}" type="datetime1">
               <a:rPr lang="en-US" smtClean="0"/>
-              <a:t>17-Apr-18</a:t>
+              <a:t>19-Apr-18</a:t>
             </a:fld>
             <a:endParaRPr lang="en-US" sz="1600" dirty="0"/>
           </a:p>
@@ -8393,7 +8393,7 @@
           <a:p>
             <a:fld id="{2896B601-46FD-445F-9989-C94F408947F5}" type="datetime1">
               <a:rPr lang="en-US" smtClean="0"/>
-              <a:t>17-Apr-18</a:t>
+              <a:t>19-Apr-18</a:t>
             </a:fld>
             <a:endParaRPr lang="en-US"/>
           </a:p>
@@ -8568,7 +8568,7 @@
           <a:p>
             <a:fld id="{8182A82C-E3C4-4EFA-835D-BE4099F13BD7}" type="datetime1">
               <a:rPr lang="en-US" smtClean="0"/>
-              <a:t>17-Apr-18</a:t>
+              <a:t>19-Apr-18</a:t>
             </a:fld>
             <a:endParaRPr lang="en-US"/>
           </a:p>
@@ -8803,7 +8803,7 @@
           <a:p>
             <a:fld id="{FCFD931D-3D37-4C63-BF61-3605EBEC620F}" type="datetime1">
               <a:rPr lang="en-US" smtClean="0"/>
-              <a:t>17-Apr-18</a:t>
+              <a:t>19-Apr-18</a:t>
             </a:fld>
             <a:endParaRPr lang="en-US" dirty="0"/>
           </a:p>
@@ -9072,7 +9072,7 @@
           <a:p>
             <a:fld id="{CD448F8B-1D78-461A-83BA-F4B873C35ED1}" type="datetime1">
               <a:rPr lang="en-US" smtClean="0"/>
-              <a:t>17-Apr-18</a:t>
+              <a:t>19-Apr-18</a:t>
             </a:fld>
             <a:endParaRPr lang="en-US" dirty="0"/>
           </a:p>
@@ -9292,7 +9292,7 @@
           <a:p>
             <a:fld id="{34E45DD9-375C-405A-A451-CBCCB57D6174}" type="datetime1">
               <a:rPr lang="en-US" smtClean="0"/>
-              <a:t>17-Apr-18</a:t>
+              <a:t>19-Apr-18</a:t>
             </a:fld>
             <a:endParaRPr lang="en-US"/>
           </a:p>
@@ -9644,7 +9644,7 @@
           <a:p>
             <a:fld id="{E1D53767-224A-4720-AE59-B3B9E9BC3254}" type="datetime1">
               <a:rPr lang="en-US" smtClean="0"/>
-              <a:t>17-Apr-18</a:t>
+              <a:t>19-Apr-18</a:t>
             </a:fld>
             <a:endParaRPr lang="en-US"/>
           </a:p>
@@ -9876,7 +9876,7 @@
           <a:p>
             <a:fld id="{63F1F3DE-51A3-4141-98FB-16D49AE48487}" type="datetime1">
               <a:rPr lang="en-US" smtClean="0"/>
-              <a:t>17-Apr-18</a:t>
+              <a:t>19-Apr-18</a:t>
             </a:fld>
             <a:endParaRPr lang="en-US"/>
           </a:p>
@@ -10017,7 +10017,7 @@
           <a:p>
             <a:fld id="{D1E33423-4425-49D6-85B0-32A7393206CC}" type="datetime1">
               <a:rPr lang="en-US" smtClean="0"/>
-              <a:t>17-Apr-18</a:t>
+              <a:t>19-Apr-18</a:t>
             </a:fld>
             <a:endParaRPr lang="en-US"/>
           </a:p>
@@ -10294,7 +10294,7 @@
           <a:p>
             <a:fld id="{63275B17-A1D5-4071-AB85-AEE62BE7AA6F}" type="datetime1">
               <a:rPr lang="en-US" smtClean="0"/>
-              <a:t>17-Apr-18</a:t>
+              <a:t>19-Apr-18</a:t>
             </a:fld>
             <a:endParaRPr lang="en-US"/>
           </a:p>
@@ -10701,7 +10701,7 @@
           <a:p>
             <a:fld id="{C01A5001-5DAE-4347-A64F-AC6D78A5473B}" type="datetime1">
               <a:rPr lang="en-US" smtClean="0"/>
-              <a:t>17-Apr-18</a:t>
+              <a:t>19-Apr-18</a:t>
             </a:fld>
             <a:endParaRPr lang="en-US"/>
           </a:p>
@@ -11038,7 +11038,7 @@
           <a:p>
             <a:fld id="{1659F9AA-4D7E-486F-818E-2E049D4FCA70}" type="datetime1">
               <a:rPr lang="en-US" smtClean="0"/>
-              <a:t>17-Apr-18</a:t>
+              <a:t>19-Apr-18</a:t>
             </a:fld>
             <a:endParaRPr lang="en-US" sz="1400" dirty="0">
               <a:solidFill>
@@ -11636,7 +11636,7 @@
           <a:p>
             <a:r>
               <a:rPr lang="nb-NO" dirty="0"/>
-              <a:t>Lars Ailo Bongo (larsab@cs.uit.no)</a:t>
+              <a:t>Lars Ailo Bongo (lars.ailo.bongo@uit.no)</a:t>
             </a:r>
             <a:endParaRPr lang="en-US" dirty="0"/>
           </a:p>
@@ -15415,7 +15415,7 @@
         <p:spPr/>
         <p:txBody>
           <a:bodyPr>
-            <a:normAutofit fontScale="92500" lnSpcReduction="10000"/>
+            <a:normAutofit fontScale="85000" lnSpcReduction="20000"/>
           </a:bodyPr>
           <a:lstStyle/>
           <a:p>
@@ -15486,7 +15486,7 @@
               <a:rPr lang="en-US" dirty="0">
                 <a:ea typeface="ＭＳ Ｐゴシック" pitchFamily="-108" charset="-128"/>
               </a:rPr>
-              <a:t>Part II (Tuesday)</a:t>
+              <a:t>Part II (Thursday)</a:t>
             </a:r>
           </a:p>
           <a:p>
@@ -15524,6 +15524,19 @@
             <a:r>
               <a:rPr lang="en-US" sz="2200" dirty="0"/>
               <a:t>Transactions and logging</a:t>
+            </a:r>
+          </a:p>
+          <a:p>
+            <a:r>
+              <a:rPr lang="en-US" sz="2800" dirty="0"/>
+              <a:t>Part III (TBA)</a:t>
+            </a:r>
+          </a:p>
+          <a:p>
+            <a:pPr lvl="1"/>
+            <a:r>
+              <a:rPr lang="en-US" sz="2500" dirty="0"/>
+              <a:t>Ext4 file system</a:t>
             </a:r>
           </a:p>
         </p:txBody>
@@ -18608,7 +18621,15 @@
             <a:pPr lvl="1"/>
             <a:r>
               <a:rPr lang="en-US" dirty="0"/>
-              <a:t>0…10: direct pointers</a:t>
+              <a:t>1</a:t>
+            </a:r>
+            <a:r>
+              <a:rPr lang="en-US"/>
+              <a:t>…10</a:t>
+            </a:r>
+            <a:r>
+              <a:rPr lang="en-US" dirty="0"/>
+              <a:t>: direct pointers</a:t>
             </a:r>
           </a:p>
           <a:p>
@@ -22475,7 +22496,7 @@
           <a:p>
             <a:r>
               <a:rPr lang="en-US" dirty="0"/>
-              <a:t>Part 1 (Thursday)</a:t>
+              <a:t>Part 1 (Tuesday)</a:t>
             </a:r>
           </a:p>
           <a:p>
@@ -22549,25 +22570,6 @@
               <a:rPr lang="en-US" dirty="0">
                 <a:ea typeface="ＭＳ Ｐゴシック" pitchFamily="-108" charset="-128"/>
               </a:rPr>
-              <a:t>File system structure</a:t>
-            </a:r>
-          </a:p>
-          <a:p>
-            <a:pPr lvl="2"/>
-            <a:r>
-              <a:rPr lang="en-US" dirty="0"/>
-              <a:t>Physical layout for performance</a:t>
-            </a:r>
-            <a:endParaRPr lang="en-US" dirty="0">
-              <a:ea typeface="ＭＳ Ｐゴシック" pitchFamily="-108" charset="-128"/>
-            </a:endParaRPr>
-          </a:p>
-          <a:p>
-            <a:pPr lvl="1"/>
-            <a:r>
-              <a:rPr lang="en-US" dirty="0">
-                <a:ea typeface="ＭＳ Ｐゴシック" pitchFamily="-108" charset="-128"/>
-              </a:rPr>
               <a:t>Performance and reliability</a:t>
             </a:r>
           </a:p>
@@ -22597,6 +22599,19 @@
             <a:r>
               <a:rPr lang="en-US" sz="2200" dirty="0"/>
               <a:t>Transactions and logging</a:t>
+            </a:r>
+          </a:p>
+          <a:p>
+            <a:r>
+              <a:rPr lang="en-US" sz="2800" dirty="0"/>
+              <a:t>Part II (TBA)</a:t>
+            </a:r>
+          </a:p>
+          <a:p>
+            <a:pPr lvl="1"/>
+            <a:r>
+              <a:rPr lang="en-US" sz="2500" dirty="0"/>
+              <a:t>Ext4 File system</a:t>
             </a:r>
           </a:p>
         </p:txBody>
@@ -22847,7 +22862,7 @@
         </p:blipFill>
         <p:spPr bwMode="auto">
           <a:xfrm>
-            <a:off x="1249" y="2667000"/>
+            <a:off x="0" y="2514600"/>
             <a:ext cx="9118060" cy="1447800"/>
           </a:xfrm>
           <a:prstGeom prst="rect">

</xml_diff>